<commit_message>
The criteria of success updated
</commit_message>
<xml_diff>
--- a/Natalia Katchoura PSW - Guided Capstone.pptx
+++ b/Natalia Katchoura PSW - Guided Capstone.pptx
@@ -257,7 +257,7 @@
       </p15:sldGuideLst>
     </p:ext>
     <p:ext uri="http://customooxmlschemas.google.com/">
-      <go:slidesCustomData xmlns="" xmlns:mc="http://schemas.openxmlformats.org/markup-compatibility/2006" xmlns:mv="urn:schemas-microsoft-com:mac:vml" xmlns:c="http://schemas.openxmlformats.org/drawingml/2006/chart" xmlns:dgm="http://schemas.openxmlformats.org/drawingml/2006/diagram" xmlns:o="urn:schemas-microsoft-com:office:office" xmlns:v="urn:schemas-microsoft-com:vml" xmlns:pvml="urn:schemas-microsoft-com:office:powerpoint" xmlns:com="http://schemas.openxmlformats.org/drawingml/2006/compatibility" xmlns:p14="http://schemas.microsoft.com/office/powerpoint/2010/main" xmlns:p15="http://schemas.microsoft.com/office/powerpoint/2012/main" xmlns:go="http://customooxmlschemas.google.com/" r:id="rId7" roundtripDataSignature="AMtx7mjdo7FECp685JsX7/4pIVeoAktjNA=="/>
+      <go:slidesCustomData xmlns:go="http://customooxmlschemas.google.com/" xmlns:p15="http://schemas.microsoft.com/office/powerpoint/2012/main" xmlns:p14="http://schemas.microsoft.com/office/powerpoint/2010/main" xmlns:com="http://schemas.openxmlformats.org/drawingml/2006/compatibility" xmlns:pvml="urn:schemas-microsoft-com:office:powerpoint" xmlns:v="urn:schemas-microsoft-com:vml" xmlns:o="urn:schemas-microsoft-com:office:office" xmlns:dgm="http://schemas.openxmlformats.org/drawingml/2006/diagram" xmlns:c="http://schemas.openxmlformats.org/drawingml/2006/chart" xmlns:mv="urn:schemas-microsoft-com:mac:vml" xmlns:mc="http://schemas.openxmlformats.org/markup-compatibility/2006" xmlns="" r:id="rId7" roundtripDataSignature="AMtx7mjdo7FECp685JsX7/4pIVeoAktjNA=="/>
     </p:ext>
   </p:extLst>
 </p:presentation>
@@ -4857,15 +4857,11 @@
             </a:r>
             <a:r>
               <a:rPr lang="en-US" sz="1200" dirty="0"/>
-              <a:t> Present the list of facilities visitors would be willing to pay </a:t>
+              <a:t> Present the list of facilities visitors would be willing to pay more. Capitalize from the resort’s existing facilities and present new investment plan (future facilities</a:t>
             </a:r>
             <a:r>
               <a:rPr lang="en-US" sz="1200"/>
-              <a:t>more. Capitalize </a:t>
-            </a:r>
-            <a:r>
-              <a:rPr lang="en-US" sz="1200" dirty="0"/>
-              <a:t>from the resort’s existing facilities and present new investment plan (future facilities) based </a:t>
+              <a:t>) </a:t>
             </a:r>
             <a:endParaRPr sz="1050" i="0" u="none" strike="noStrike" cap="none" dirty="0">
               <a:solidFill>

</xml_diff>